<commit_message>
logparser: updated to cleanup old records
Remove old records without runtime id before commting new records.
Will improve performance as TESTCASE_FUNC queries will be off loaded.

external=no
</commit_message>
<xml_diff>
--- a/docs/turtle.pptx
+++ b/docs/turtle.pptx
@@ -199,7 +199,7 @@
             <a:fld id="{3023D0BB-018F-422F-ADFF-35EDD49EFF3E}" type="datetimeFigureOut">
               <a:rPr lang="en-US" smtClean="0"/>
               <a:pPr/>
-              <a:t>11/6/2016</a:t>
+              <a:t>11/18/2016</a:t>
             </a:fld>
             <a:endParaRPr lang="en-US"/>
           </a:p>
@@ -2976,7 +2976,7 @@
             <a:fld id="{A2977C27-B067-41C3-A134-2EEC22F52C6D}" type="datetimeFigureOut">
               <a:rPr lang="en-US" smtClean="0"/>
               <a:pPr/>
-              <a:t>11/6/2016</a:t>
+              <a:t>11/18/2016</a:t>
             </a:fld>
             <a:endParaRPr lang="en-US"/>
           </a:p>
@@ -3143,7 +3143,7 @@
             <a:fld id="{A2977C27-B067-41C3-A134-2EEC22F52C6D}" type="datetimeFigureOut">
               <a:rPr lang="en-US" smtClean="0"/>
               <a:pPr/>
-              <a:t>11/6/2016</a:t>
+              <a:t>11/18/2016</a:t>
             </a:fld>
             <a:endParaRPr lang="en-US"/>
           </a:p>
@@ -3320,7 +3320,7 @@
             <a:fld id="{A2977C27-B067-41C3-A134-2EEC22F52C6D}" type="datetimeFigureOut">
               <a:rPr lang="en-US" smtClean="0"/>
               <a:pPr/>
-              <a:t>11/6/2016</a:t>
+              <a:t>11/18/2016</a:t>
             </a:fld>
             <a:endParaRPr lang="en-US"/>
           </a:p>
@@ -3487,7 +3487,7 @@
             <a:fld id="{A2977C27-B067-41C3-A134-2EEC22F52C6D}" type="datetimeFigureOut">
               <a:rPr lang="en-US" smtClean="0"/>
               <a:pPr/>
-              <a:t>11/6/2016</a:t>
+              <a:t>11/18/2016</a:t>
             </a:fld>
             <a:endParaRPr lang="en-US"/>
           </a:p>
@@ -3730,7 +3730,7 @@
             <a:fld id="{A2977C27-B067-41C3-A134-2EEC22F52C6D}" type="datetimeFigureOut">
               <a:rPr lang="en-US" smtClean="0"/>
               <a:pPr/>
-              <a:t>11/6/2016</a:t>
+              <a:t>11/18/2016</a:t>
             </a:fld>
             <a:endParaRPr lang="en-US"/>
           </a:p>
@@ -4015,7 +4015,7 @@
             <a:fld id="{A2977C27-B067-41C3-A134-2EEC22F52C6D}" type="datetimeFigureOut">
               <a:rPr lang="en-US" smtClean="0"/>
               <a:pPr/>
-              <a:t>11/6/2016</a:t>
+              <a:t>11/18/2016</a:t>
             </a:fld>
             <a:endParaRPr lang="en-US"/>
           </a:p>
@@ -4434,7 +4434,7 @@
             <a:fld id="{A2977C27-B067-41C3-A134-2EEC22F52C6D}" type="datetimeFigureOut">
               <a:rPr lang="en-US" smtClean="0"/>
               <a:pPr/>
-              <a:t>11/6/2016</a:t>
+              <a:t>11/18/2016</a:t>
             </a:fld>
             <a:endParaRPr lang="en-US"/>
           </a:p>
@@ -4549,7 +4549,7 @@
             <a:fld id="{A2977C27-B067-41C3-A134-2EEC22F52C6D}" type="datetimeFigureOut">
               <a:rPr lang="en-US" smtClean="0"/>
               <a:pPr/>
-              <a:t>11/6/2016</a:t>
+              <a:t>11/18/2016</a:t>
             </a:fld>
             <a:endParaRPr lang="en-US"/>
           </a:p>
@@ -4641,7 +4641,7 @@
             <a:fld id="{A2977C27-B067-41C3-A134-2EEC22F52C6D}" type="datetimeFigureOut">
               <a:rPr lang="en-US" smtClean="0"/>
               <a:pPr/>
-              <a:t>11/6/2016</a:t>
+              <a:t>11/18/2016</a:t>
             </a:fld>
             <a:endParaRPr lang="en-US"/>
           </a:p>
@@ -4915,7 +4915,7 @@
             <a:fld id="{A2977C27-B067-41C3-A134-2EEC22F52C6D}" type="datetimeFigureOut">
               <a:rPr lang="en-US" smtClean="0"/>
               <a:pPr/>
-              <a:t>11/6/2016</a:t>
+              <a:t>11/18/2016</a:t>
             </a:fld>
             <a:endParaRPr lang="en-US"/>
           </a:p>
@@ -5165,7 +5165,7 @@
             <a:fld id="{A2977C27-B067-41C3-A134-2EEC22F52C6D}" type="datetimeFigureOut">
               <a:rPr lang="en-US" smtClean="0"/>
               <a:pPr/>
-              <a:t>11/6/2016</a:t>
+              <a:t>11/18/2016</a:t>
             </a:fld>
             <a:endParaRPr lang="en-US"/>
           </a:p>
@@ -5375,7 +5375,7 @@
             <a:fld id="{A2977C27-B067-41C3-A134-2EEC22F52C6D}" type="datetimeFigureOut">
               <a:rPr lang="en-US" smtClean="0"/>
               <a:pPr/>
-              <a:t>11/6/2016</a:t>
+              <a:t>11/18/2016</a:t>
             </a:fld>
             <a:endParaRPr lang="en-US"/>
           </a:p>
@@ -5795,9 +5795,24 @@
             </a:r>
             <a:r>
               <a:rPr lang="en-US" dirty="0" smtClean="0"/>
-              <a:t>-tool]</a:t>
-            </a:r>
-            <a:endParaRPr lang="en-US" dirty="0"/>
+              <a:t>-tool</a:t>
+            </a:r>
+            <a:r>
+              <a:rPr lang="en-US" dirty="0" smtClean="0"/>
+              <a:t>]</a:t>
+            </a:r>
+            <a:br>
+              <a:rPr lang="en-US" dirty="0" smtClean="0"/>
+            </a:br>
+            <a:r>
+              <a:rPr lang="en-US" dirty="0" smtClean="0"/>
+              <a:t>Emula</a:t>
+            </a:r>
+            <a:r>
+              <a:rPr lang="en-US" b="1" dirty="0" smtClean="0"/>
+              <a:t>tors Tool</a:t>
+            </a:r>
+            <a:endParaRPr lang="en-US" b="1" dirty="0"/>
           </a:p>
         </p:txBody>
       </p:sp>
@@ -8808,40 +8823,40 @@
                   </a:schemeClr>
                 </a:solidFill>
               </a:rPr>
-              <a:t>Test-case performance history (graph report</a:t>
-            </a:r>
-            <a:r>
-              <a:rPr lang="en-US" dirty="0" smtClean="0">
+              <a:t>Test-case performance history (graph report)</a:t>
+            </a:r>
+          </a:p>
+          <a:p>
+            <a:pPr marL="914400" lvl="1" indent="-514350"/>
+            <a:r>
+              <a:rPr lang="en-US" smtClean="0">
                 <a:solidFill>
                   <a:schemeClr val="bg1">
                     <a:lumMod val="50000"/>
                   </a:schemeClr>
                 </a:solidFill>
               </a:rPr>
-              <a:t>)</a:t>
-            </a:r>
-          </a:p>
-          <a:p>
-            <a:pPr marL="914400" lvl="1" indent="-514350"/>
-            <a:r>
-              <a:rPr lang="en-US" smtClean="0">
+              <a:t>Tests </a:t>
+            </a:r>
+            <a:r>
+              <a:rPr lang="en-US" dirty="0" smtClean="0">
                 <a:solidFill>
                   <a:schemeClr val="bg1">
                     <a:lumMod val="50000"/>
                   </a:schemeClr>
                 </a:solidFill>
               </a:rPr>
-              <a:t>Tests </a:t>
-            </a:r>
-            <a:r>
-              <a:rPr lang="en-US" dirty="0" smtClean="0">
+              <a:t>to fail on </a:t>
+            </a:r>
+            <a:r>
+              <a:rPr lang="en-US" dirty="0" err="1" smtClean="0">
                 <a:solidFill>
                   <a:schemeClr val="bg1">
                     <a:lumMod val="50000"/>
                   </a:schemeClr>
                 </a:solidFill>
               </a:rPr>
-              <a:t>to fail </a:t>
+              <a:t>perf</a:t>
             </a:r>
             <a:r>
               <a:rPr lang="en-US" dirty="0" smtClean="0">
@@ -8851,35 +8866,8 @@
                   </a:schemeClr>
                 </a:solidFill>
               </a:rPr>
-              <a:t>on </a:t>
-            </a:r>
-            <a:r>
-              <a:rPr lang="en-US" dirty="0" err="1" smtClean="0">
-                <a:solidFill>
-                  <a:schemeClr val="bg1">
-                    <a:lumMod val="50000"/>
-                  </a:schemeClr>
-                </a:solidFill>
-              </a:rPr>
-              <a:t>perf</a:t>
-            </a:r>
-            <a:r>
-              <a:rPr lang="en-US" dirty="0" smtClean="0">
-                <a:solidFill>
-                  <a:schemeClr val="bg1">
-                    <a:lumMod val="50000"/>
-                  </a:schemeClr>
-                </a:solidFill>
-              </a:rPr>
               <a:t> degradation</a:t>
             </a:r>
-            <a:endParaRPr lang="en-US" dirty="0" smtClean="0">
-              <a:solidFill>
-                <a:schemeClr val="bg1">
-                  <a:lumMod val="50000"/>
-                </a:schemeClr>
-              </a:solidFill>
-            </a:endParaRPr>
           </a:p>
           <a:p>
             <a:pPr marL="514350" indent="-514350">

</xml_diff>